<commit_message>
add(Reports): add Lab reports
</commit_message>
<xml_diff>
--- a/PaperNote/GNN/CCGNet/CCGNet.pptx
+++ b/PaperNote/GNN/CCGNet/CCGNet.pptx
@@ -15,14 +15,16 @@
     <p:sldId id="524" r:id="rId8"/>
     <p:sldId id="525" r:id="rId9"/>
     <p:sldId id="526" r:id="rId10"/>
-    <p:sldId id="527" r:id="rId11"/>
-    <p:sldId id="533" r:id="rId12"/>
-    <p:sldId id="534" r:id="rId13"/>
-    <p:sldId id="529" r:id="rId14"/>
-    <p:sldId id="530" r:id="rId15"/>
-    <p:sldId id="531" r:id="rId16"/>
-    <p:sldId id="532" r:id="rId17"/>
-    <p:sldId id="513" r:id="rId18"/>
+    <p:sldId id="540" r:id="rId11"/>
+    <p:sldId id="541" r:id="rId12"/>
+    <p:sldId id="527" r:id="rId13"/>
+    <p:sldId id="533" r:id="rId14"/>
+    <p:sldId id="534" r:id="rId15"/>
+    <p:sldId id="529" r:id="rId16"/>
+    <p:sldId id="530" r:id="rId17"/>
+    <p:sldId id="531" r:id="rId18"/>
+    <p:sldId id="532" r:id="rId19"/>
+    <p:sldId id="513" r:id="rId20"/>
   </p:sldIdLst>
   <p:sldSz cx="12192000" cy="6858000"/>
   <p:notesSz cx="6858000" cy="9144000"/>
@@ -129,15 +131,6 @@
   <p:cmAuthor id="1" name="Windows 用户" initials="W用" lastIdx="1" clrIdx="0"/>
   <p:cmAuthor id="2" name="yuyouyu" initials="y" lastIdx="1" clrIdx="1"/>
 </p:cmAuthorLst>
-</file>
-
-<file path=ppt/comments/comment1.xml><?xml version="1.0" encoding="utf-8"?>
-<p:cmLst xmlns:a="http://schemas.openxmlformats.org/drawingml/2006/main" xmlns:r="http://schemas.openxmlformats.org/officeDocument/2006/relationships" xmlns:p="http://schemas.openxmlformats.org/presentationml/2006/main">
-  <p:cm authorId="2" dt="2021-10-19T21:05:03.945" idx="1">
-    <p:pos x="5431" y="885"/>
-    <p:text/>
-  </p:cm>
-</p:cmLst>
 </file>
 
 <file path=ppt/notesMasters/notesMaster1.xml><?xml version="1.0" encoding="utf-8"?>
@@ -4919,6 +4912,755 @@
           <a:bodyPr/>
           <a:p>
             <a:r>
+              <a:rPr lang="zh-CN" altLang="en-US" sz="3200" b="1"/>
+              <a:t>Construction of CCGNet model.</a:t>
+            </a:r>
+            <a:endParaRPr lang="zh-CN" altLang="en-US" sz="3200" b="1"/>
+          </a:p>
+        </p:txBody>
+      </p:sp>
+      <p:sp>
+        <p:nvSpPr>
+          <p:cNvPr id="4" name="灯片编号占位符 3"/>
+          <p:cNvSpPr>
+            <a:spLocks noGrp="1"/>
+          </p:cNvSpPr>
+          <p:nvPr>
+            <p:ph type="sldNum" sz="quarter" idx="12"/>
+          </p:nvPr>
+        </p:nvSpPr>
+        <p:spPr/>
+        <p:txBody>
+          <a:bodyPr/>
+          <a:p>
+            <a:fld id="{89DB14B3-731A-4352-BC82-B1993596BD11}" type="slidenum">
+              <a:rPr lang="zh-CN" altLang="en-US" smtClean="0"/>
+            </a:fld>
+            <a:endParaRPr lang="zh-CN" altLang="en-US" dirty="0"/>
+          </a:p>
+        </p:txBody>
+      </p:sp>
+      <p:pic>
+        <p:nvPicPr>
+          <p:cNvPr id="5" name="图片 4"/>
+          <p:cNvPicPr>
+            <a:picLocks noChangeAspect="1"/>
+          </p:cNvPicPr>
+          <p:nvPr/>
+        </p:nvPicPr>
+        <p:blipFill>
+          <a:blip r:embed="rId1"/>
+          <a:stretch>
+            <a:fillRect/>
+          </a:stretch>
+        </p:blipFill>
+        <p:spPr>
+          <a:xfrm>
+            <a:off x="1487805" y="1012825"/>
+            <a:ext cx="9372600" cy="5581650"/>
+          </a:xfrm>
+          <a:prstGeom prst="rect">
+            <a:avLst/>
+          </a:prstGeom>
+        </p:spPr>
+      </p:pic>
+      <p:sp>
+        <p:nvSpPr>
+          <p:cNvPr id="6" name="圆角矩形 5"/>
+          <p:cNvSpPr/>
+          <p:nvPr/>
+        </p:nvSpPr>
+        <p:spPr>
+          <a:xfrm>
+            <a:off x="6572250" y="1365250"/>
+            <a:ext cx="616585" cy="655955"/>
+          </a:xfrm>
+          <a:prstGeom prst="roundRect">
+            <a:avLst/>
+          </a:prstGeom>
+          <a:noFill/>
+          <a:ln w="25400" cap="flat" cmpd="sng" algn="ctr">
+            <a:solidFill>
+              <a:srgbClr val="FF0000"/>
+            </a:solidFill>
+            <a:prstDash val="solid"/>
+            <a:round/>
+            <a:headEnd type="none" w="med" len="med"/>
+            <a:tailEnd type="none" w="med" len="med"/>
+          </a:ln>
+        </p:spPr>
+        <p:txBody>
+          <a:bodyPr vert="horz" wrap="square" lIns="91440" tIns="45720" rIns="91440" bIns="45720" numCol="1" anchor="t" anchorCtr="0" compatLnSpc="1"/>
+          <a:p>
+            <a:pPr marL="0" marR="0" indent="0" algn="l" defTabSz="914400" rtl="0" eaLnBrk="1" fontAlgn="base" latinLnBrk="0" hangingPunct="1">
+              <a:lnSpc>
+                <a:spcPct val="100000"/>
+              </a:lnSpc>
+              <a:spcBef>
+                <a:spcPct val="0"/>
+              </a:spcBef>
+              <a:spcAft>
+                <a:spcPct val="0"/>
+              </a:spcAft>
+              <a:buClrTx/>
+              <a:buSzTx/>
+              <a:buFontTx/>
+              <a:buNone/>
+            </a:pPr>
+            <a:endParaRPr kumimoji="0" lang="zh-CN" altLang="en-US" sz="1800" b="0" i="0" u="none" strike="noStrike" cap="none" normalizeH="0" baseline="0" smtClean="0">
+              <a:ln>
+                <a:noFill/>
+              </a:ln>
+              <a:solidFill>
+                <a:srgbClr val="000000"/>
+              </a:solidFill>
+              <a:effectLst/>
+              <a:latin typeface="Calibri" panose="020F0702030404030204" charset="0"/>
+              <a:ea typeface="SimSun" pitchFamily="2" charset="-122"/>
+              <a:sym typeface="Calibri" panose="020F0702030404030204" charset="0"/>
+            </a:endParaRPr>
+          </a:p>
+        </p:txBody>
+      </p:sp>
+      <p:sp>
+        <p:nvSpPr>
+          <p:cNvPr id="7" name="圆角矩形 6"/>
+          <p:cNvSpPr/>
+          <p:nvPr/>
+        </p:nvSpPr>
+        <p:spPr>
+          <a:xfrm>
+            <a:off x="6572250" y="2546350"/>
+            <a:ext cx="616585" cy="655955"/>
+          </a:xfrm>
+          <a:prstGeom prst="roundRect">
+            <a:avLst/>
+          </a:prstGeom>
+          <a:noFill/>
+          <a:ln w="25400" cap="flat" cmpd="sng" algn="ctr">
+            <a:solidFill>
+              <a:srgbClr val="FF0000"/>
+            </a:solidFill>
+            <a:prstDash val="solid"/>
+            <a:round/>
+            <a:headEnd type="none" w="med" len="med"/>
+            <a:tailEnd type="none" w="med" len="med"/>
+          </a:ln>
+        </p:spPr>
+        <p:txBody>
+          <a:bodyPr vert="horz" wrap="square" lIns="91440" tIns="45720" rIns="91440" bIns="45720" numCol="1" anchor="t" anchorCtr="0" compatLnSpc="1"/>
+          <a:p>
+            <a:pPr marL="0" marR="0" indent="0" algn="l" defTabSz="914400" rtl="0" eaLnBrk="1" fontAlgn="base" latinLnBrk="0" hangingPunct="1">
+              <a:lnSpc>
+                <a:spcPct val="100000"/>
+              </a:lnSpc>
+              <a:spcBef>
+                <a:spcPct val="0"/>
+              </a:spcBef>
+              <a:spcAft>
+                <a:spcPct val="0"/>
+              </a:spcAft>
+              <a:buClrTx/>
+              <a:buSzTx/>
+              <a:buFontTx/>
+              <a:buNone/>
+            </a:pPr>
+            <a:endParaRPr kumimoji="0" lang="zh-CN" altLang="en-US" sz="1800" b="0" i="0" u="none" strike="noStrike" cap="none" normalizeH="0" baseline="0" smtClean="0">
+              <a:ln>
+                <a:noFill/>
+              </a:ln>
+              <a:solidFill>
+                <a:srgbClr val="000000"/>
+              </a:solidFill>
+              <a:effectLst/>
+              <a:latin typeface="Calibri" panose="020F0702030404030204" charset="0"/>
+              <a:ea typeface="SimSun" pitchFamily="2" charset="-122"/>
+              <a:sym typeface="Calibri" panose="020F0702030404030204" charset="0"/>
+            </a:endParaRPr>
+          </a:p>
+        </p:txBody>
+      </p:sp>
+      <p:sp>
+        <p:nvSpPr>
+          <p:cNvPr id="8" name="圆角矩形 7"/>
+          <p:cNvSpPr/>
+          <p:nvPr/>
+        </p:nvSpPr>
+        <p:spPr>
+          <a:xfrm>
+            <a:off x="4849495" y="1890395"/>
+            <a:ext cx="616585" cy="655955"/>
+          </a:xfrm>
+          <a:prstGeom prst="roundRect">
+            <a:avLst/>
+          </a:prstGeom>
+          <a:noFill/>
+          <a:ln w="25400" cap="flat" cmpd="sng" algn="ctr">
+            <a:solidFill>
+              <a:srgbClr val="FF0000"/>
+            </a:solidFill>
+            <a:prstDash val="solid"/>
+            <a:round/>
+            <a:headEnd type="none" w="med" len="med"/>
+            <a:tailEnd type="none" w="med" len="med"/>
+          </a:ln>
+        </p:spPr>
+        <p:txBody>
+          <a:bodyPr vert="horz" wrap="square" lIns="91440" tIns="45720" rIns="91440" bIns="45720" numCol="1" anchor="t" anchorCtr="0" compatLnSpc="1"/>
+          <a:p>
+            <a:pPr marL="0" marR="0" indent="0" algn="l" defTabSz="914400" rtl="0" eaLnBrk="1" fontAlgn="base" latinLnBrk="0" hangingPunct="1">
+              <a:lnSpc>
+                <a:spcPct val="100000"/>
+              </a:lnSpc>
+              <a:spcBef>
+                <a:spcPct val="0"/>
+              </a:spcBef>
+              <a:spcAft>
+                <a:spcPct val="0"/>
+              </a:spcAft>
+              <a:buClrTx/>
+              <a:buSzTx/>
+              <a:buFontTx/>
+              <a:buNone/>
+            </a:pPr>
+            <a:endParaRPr kumimoji="0" lang="zh-CN" altLang="en-US" sz="1800" b="0" i="0" u="none" strike="noStrike" cap="none" normalizeH="0" baseline="0" smtClean="0">
+              <a:ln>
+                <a:noFill/>
+              </a:ln>
+              <a:solidFill>
+                <a:srgbClr val="000000"/>
+              </a:solidFill>
+              <a:effectLst/>
+              <a:latin typeface="Calibri" panose="020F0702030404030204" charset="0"/>
+              <a:ea typeface="SimSun" pitchFamily="2" charset="-122"/>
+              <a:sym typeface="Calibri" panose="020F0702030404030204" charset="0"/>
+            </a:endParaRPr>
+          </a:p>
+        </p:txBody>
+      </p:sp>
+      <p:sp>
+        <p:nvSpPr>
+          <p:cNvPr id="9" name="圆角矩形 8"/>
+          <p:cNvSpPr/>
+          <p:nvPr/>
+        </p:nvSpPr>
+        <p:spPr>
+          <a:xfrm>
+            <a:off x="2672080" y="3629660"/>
+            <a:ext cx="1471930" cy="507365"/>
+          </a:xfrm>
+          <a:prstGeom prst="roundRect">
+            <a:avLst/>
+          </a:prstGeom>
+          <a:noFill/>
+          <a:ln w="25400" cap="flat" cmpd="sng" algn="ctr">
+            <a:solidFill>
+              <a:srgbClr val="FF0000"/>
+            </a:solidFill>
+            <a:prstDash val="solid"/>
+            <a:round/>
+            <a:headEnd type="none" w="med" len="med"/>
+            <a:tailEnd type="none" w="med" len="med"/>
+          </a:ln>
+        </p:spPr>
+        <p:txBody>
+          <a:bodyPr vert="horz" wrap="square" lIns="91440" tIns="45720" rIns="91440" bIns="45720" numCol="1" anchor="t" anchorCtr="0" compatLnSpc="1"/>
+          <a:p>
+            <a:pPr marL="0" marR="0" indent="0" algn="l" defTabSz="914400" rtl="0" eaLnBrk="1" fontAlgn="base" latinLnBrk="0" hangingPunct="1">
+              <a:lnSpc>
+                <a:spcPct val="100000"/>
+              </a:lnSpc>
+              <a:spcBef>
+                <a:spcPct val="0"/>
+              </a:spcBef>
+              <a:spcAft>
+                <a:spcPct val="0"/>
+              </a:spcAft>
+              <a:buClrTx/>
+              <a:buSzTx/>
+              <a:buFontTx/>
+              <a:buNone/>
+            </a:pPr>
+            <a:endParaRPr kumimoji="0" lang="zh-CN" altLang="en-US" sz="1800" b="0" i="0" u="none" strike="noStrike" cap="none" normalizeH="0" baseline="0" smtClean="0">
+              <a:ln>
+                <a:noFill/>
+              </a:ln>
+              <a:solidFill>
+                <a:srgbClr val="000000"/>
+              </a:solidFill>
+              <a:effectLst/>
+              <a:latin typeface="Calibri" panose="020F0702030404030204" charset="0"/>
+              <a:ea typeface="SimSun" pitchFamily="2" charset="-122"/>
+              <a:sym typeface="Calibri" panose="020F0702030404030204" charset="0"/>
+            </a:endParaRPr>
+          </a:p>
+        </p:txBody>
+      </p:sp>
+    </p:spTree>
+  </p:cSld>
+  <p:clrMapOvr>
+    <a:masterClrMapping/>
+  </p:clrMapOvr>
+  <p:transition spd="med">
+    <p:cut/>
+  </p:transition>
+</p:sld>
+</file>
+
+<file path=ppt/slides/slide11.xml><?xml version="1.0" encoding="utf-8"?>
+<p:sld xmlns:a="http://schemas.openxmlformats.org/drawingml/2006/main" xmlns:r="http://schemas.openxmlformats.org/officeDocument/2006/relationships" xmlns:p="http://schemas.openxmlformats.org/presentationml/2006/main">
+  <p:cSld>
+    <p:spTree>
+      <p:nvGrpSpPr>
+        <p:cNvPr id="1" name=""/>
+        <p:cNvGrpSpPr/>
+        <p:nvPr/>
+      </p:nvGrpSpPr>
+      <p:grpSpPr/>
+      <p:sp>
+        <p:nvSpPr>
+          <p:cNvPr id="4" name="灯片编号占位符 3"/>
+          <p:cNvSpPr>
+            <a:spLocks noGrp="1"/>
+          </p:cNvSpPr>
+          <p:nvPr>
+            <p:ph type="sldNum" sz="quarter" idx="12"/>
+          </p:nvPr>
+        </p:nvSpPr>
+        <p:spPr/>
+        <p:txBody>
+          <a:bodyPr/>
+          <a:p>
+            <a:fld id="{89DB14B3-731A-4352-BC82-B1993596BD11}" type="slidenum">
+              <a:rPr lang="zh-CN" altLang="en-US" smtClean="0"/>
+            </a:fld>
+            <a:endParaRPr lang="zh-CN" altLang="en-US" dirty="0"/>
+          </a:p>
+        </p:txBody>
+      </p:sp>
+      <p:pic>
+        <p:nvPicPr>
+          <p:cNvPr id="11" name="图片 10"/>
+          <p:cNvPicPr>
+            <a:picLocks noChangeAspect="1"/>
+          </p:cNvPicPr>
+          <p:nvPr/>
+        </p:nvPicPr>
+        <p:blipFill>
+          <a:blip r:embed="rId1"/>
+          <a:stretch>
+            <a:fillRect/>
+          </a:stretch>
+        </p:blipFill>
+        <p:spPr>
+          <a:xfrm>
+            <a:off x="5610860" y="3703955"/>
+            <a:ext cx="6149975" cy="1938020"/>
+          </a:xfrm>
+          <a:prstGeom prst="rect">
+            <a:avLst/>
+          </a:prstGeom>
+        </p:spPr>
+      </p:pic>
+      <p:pic>
+        <p:nvPicPr>
+          <p:cNvPr id="12" name="图片 11"/>
+          <p:cNvPicPr>
+            <a:picLocks noChangeAspect="1"/>
+          </p:cNvPicPr>
+          <p:nvPr/>
+        </p:nvPicPr>
+        <p:blipFill>
+          <a:blip r:embed="rId2"/>
+          <a:stretch>
+            <a:fillRect/>
+          </a:stretch>
+        </p:blipFill>
+        <p:spPr>
+          <a:xfrm>
+            <a:off x="5963920" y="1686560"/>
+            <a:ext cx="1657350" cy="1409700"/>
+          </a:xfrm>
+          <a:prstGeom prst="rect">
+            <a:avLst/>
+          </a:prstGeom>
+        </p:spPr>
+      </p:pic>
+      <p:pic>
+        <p:nvPicPr>
+          <p:cNvPr id="13" name="图片 12" descr="Node update function Φv"/>
+          <p:cNvPicPr>
+            <a:picLocks noChangeAspect="1"/>
+          </p:cNvPicPr>
+          <p:nvPr/>
+        </p:nvPicPr>
+        <p:blipFill>
+          <a:blip r:embed="rId3"/>
+          <a:stretch>
+            <a:fillRect/>
+          </a:stretch>
+        </p:blipFill>
+        <p:spPr>
+          <a:xfrm>
+            <a:off x="152400" y="-80010"/>
+            <a:ext cx="5724525" cy="6381750"/>
+          </a:xfrm>
+          <a:prstGeom prst="rect">
+            <a:avLst/>
+          </a:prstGeom>
+        </p:spPr>
+      </p:pic>
+      <p:sp>
+        <p:nvSpPr>
+          <p:cNvPr id="15" name="下箭头标注 14"/>
+          <p:cNvSpPr/>
+          <p:nvPr/>
+        </p:nvSpPr>
+        <p:spPr>
+          <a:xfrm>
+            <a:off x="3639185" y="1006475"/>
+            <a:ext cx="487680" cy="596900"/>
+          </a:xfrm>
+          <a:prstGeom prst="downArrowCallout">
+            <a:avLst/>
+          </a:prstGeom>
+          <a:solidFill>
+            <a:schemeClr val="accent1"/>
+          </a:solidFill>
+          <a:ln w="9525" cap="flat" cmpd="sng" algn="ctr">
+            <a:solidFill>
+              <a:schemeClr val="tx1"/>
+            </a:solidFill>
+            <a:prstDash val="solid"/>
+            <a:round/>
+            <a:headEnd type="none" w="med" len="med"/>
+            <a:tailEnd type="none" w="med" len="med"/>
+          </a:ln>
+        </p:spPr>
+        <p:txBody>
+          <a:bodyPr vert="horz" wrap="square" lIns="91440" tIns="45720" rIns="91440" bIns="45720" numCol="1" anchor="t" anchorCtr="0" compatLnSpc="1"/>
+          <a:p>
+            <a:pPr marL="0" marR="0" indent="0" algn="l" defTabSz="914400" rtl="0" eaLnBrk="1" fontAlgn="base" latinLnBrk="0" hangingPunct="1">
+              <a:lnSpc>
+                <a:spcPct val="100000"/>
+              </a:lnSpc>
+              <a:spcBef>
+                <a:spcPct val="0"/>
+              </a:spcBef>
+              <a:spcAft>
+                <a:spcPct val="0"/>
+              </a:spcAft>
+              <a:buClrTx/>
+              <a:buSzTx/>
+              <a:buFontTx/>
+              <a:buNone/>
+            </a:pPr>
+            <a:r>
+              <a:rPr kumimoji="0" lang="en-US" altLang="zh-CN" sz="1000" b="1" i="0" u="none" strike="noStrike" cap="none" normalizeH="0" baseline="0" smtClean="0">
+                <a:ln>
+                  <a:noFill/>
+                </a:ln>
+                <a:solidFill>
+                  <a:schemeClr val="bg1"/>
+                </a:solidFill>
+                <a:effectLst/>
+                <a:latin typeface="Calibri" panose="020F0702030404030204" charset="0"/>
+                <a:ea typeface="SimSun" pitchFamily="2" charset="-122"/>
+                <a:sym typeface="Calibri" panose="020F0702030404030204" charset="0"/>
+              </a:rPr>
+              <a:t>N*N</a:t>
+            </a:r>
+            <a:endParaRPr kumimoji="0" lang="en-US" altLang="zh-CN" sz="1000" b="1" i="0" u="none" strike="noStrike" cap="none" normalizeH="0" baseline="0" smtClean="0">
+              <a:ln>
+                <a:noFill/>
+              </a:ln>
+              <a:solidFill>
+                <a:schemeClr val="bg1"/>
+              </a:solidFill>
+              <a:effectLst/>
+              <a:latin typeface="Calibri" panose="020F0702030404030204" charset="0"/>
+              <a:ea typeface="SimSun" pitchFamily="2" charset="-122"/>
+              <a:sym typeface="Calibri" panose="020F0702030404030204" charset="0"/>
+            </a:endParaRPr>
+          </a:p>
+        </p:txBody>
+      </p:sp>
+      <p:sp>
+        <p:nvSpPr>
+          <p:cNvPr id="16" name="右弧形箭头 15"/>
+          <p:cNvSpPr/>
+          <p:nvPr/>
+        </p:nvSpPr>
+        <p:spPr>
+          <a:xfrm>
+            <a:off x="4494530" y="1871980"/>
+            <a:ext cx="835025" cy="1064260"/>
+          </a:xfrm>
+          <a:prstGeom prst="curvedLeftArrow">
+            <a:avLst/>
+          </a:prstGeom>
+          <a:solidFill>
+            <a:schemeClr val="accent1"/>
+          </a:solidFill>
+          <a:ln w="9525" cap="flat" cmpd="sng" algn="ctr">
+            <a:solidFill>
+              <a:schemeClr val="tx1"/>
+            </a:solidFill>
+            <a:prstDash val="solid"/>
+            <a:round/>
+            <a:headEnd type="none" w="med" len="med"/>
+            <a:tailEnd type="none" w="med" len="med"/>
+          </a:ln>
+        </p:spPr>
+        <p:txBody>
+          <a:bodyPr vert="horz" wrap="square" lIns="91440" tIns="45720" rIns="91440" bIns="45720" numCol="1" anchor="t" anchorCtr="0" compatLnSpc="1"/>
+          <a:p>
+            <a:pPr marL="0" marR="0" indent="0" algn="l" defTabSz="914400" rtl="0" eaLnBrk="1" fontAlgn="base" latinLnBrk="0" hangingPunct="1">
+              <a:lnSpc>
+                <a:spcPct val="100000"/>
+              </a:lnSpc>
+              <a:spcBef>
+                <a:spcPct val="0"/>
+              </a:spcBef>
+              <a:spcAft>
+                <a:spcPct val="0"/>
+              </a:spcAft>
+              <a:buClrTx/>
+              <a:buSzTx/>
+              <a:buFontTx/>
+              <a:buNone/>
+            </a:pPr>
+            <a:endParaRPr kumimoji="0" lang="zh-CN" altLang="en-US" sz="1800" b="0" i="0" u="none" strike="noStrike" cap="none" normalizeH="0" baseline="0" smtClean="0">
+              <a:ln>
+                <a:noFill/>
+              </a:ln>
+              <a:solidFill>
+                <a:schemeClr val="tx1"/>
+              </a:solidFill>
+              <a:effectLst/>
+              <a:latin typeface="Calibri" panose="020F0702030404030204" charset="0"/>
+              <a:ea typeface="SimSun" pitchFamily="2" charset="-122"/>
+              <a:sym typeface="Calibri" panose="020F0702030404030204" charset="0"/>
+            </a:endParaRPr>
+          </a:p>
+        </p:txBody>
+      </p:sp>
+      <p:sp>
+        <p:nvSpPr>
+          <p:cNvPr id="17" name="右弧形箭头 16"/>
+          <p:cNvSpPr/>
+          <p:nvPr/>
+        </p:nvSpPr>
+        <p:spPr>
+          <a:xfrm>
+            <a:off x="4563745" y="3096260"/>
+            <a:ext cx="765810" cy="894715"/>
+          </a:xfrm>
+          <a:prstGeom prst="curvedLeftArrow">
+            <a:avLst/>
+          </a:prstGeom>
+          <a:solidFill>
+            <a:schemeClr val="accent1"/>
+          </a:solidFill>
+          <a:ln w="9525" cap="flat" cmpd="sng" algn="ctr">
+            <a:solidFill>
+              <a:schemeClr val="tx1"/>
+            </a:solidFill>
+            <a:prstDash val="solid"/>
+            <a:round/>
+            <a:headEnd type="none" w="med" len="med"/>
+            <a:tailEnd type="none" w="med" len="med"/>
+          </a:ln>
+        </p:spPr>
+        <p:txBody>
+          <a:bodyPr vert="horz" wrap="square" lIns="91440" tIns="45720" rIns="91440" bIns="45720" numCol="1" anchor="t" anchorCtr="0" compatLnSpc="1"/>
+          <a:p>
+            <a:pPr marL="0" marR="0" indent="0" algn="l" defTabSz="914400" rtl="0" eaLnBrk="1" fontAlgn="base" latinLnBrk="0" hangingPunct="1">
+              <a:lnSpc>
+                <a:spcPct val="100000"/>
+              </a:lnSpc>
+              <a:spcBef>
+                <a:spcPct val="0"/>
+              </a:spcBef>
+              <a:spcAft>
+                <a:spcPct val="0"/>
+              </a:spcAft>
+              <a:buClrTx/>
+              <a:buSzTx/>
+              <a:buFontTx/>
+              <a:buNone/>
+            </a:pPr>
+            <a:endParaRPr kumimoji="0" lang="zh-CN" altLang="en-US" sz="1800" b="0" i="0" u="none" strike="noStrike" cap="none" normalizeH="0" baseline="0" smtClean="0">
+              <a:ln>
+                <a:noFill/>
+              </a:ln>
+              <a:solidFill>
+                <a:schemeClr val="tx1"/>
+              </a:solidFill>
+              <a:effectLst/>
+              <a:latin typeface="Calibri" panose="020F0702030404030204" charset="0"/>
+              <a:ea typeface="SimSun" pitchFamily="2" charset="-122"/>
+              <a:sym typeface="Calibri" panose="020F0702030404030204" charset="0"/>
+            </a:endParaRPr>
+          </a:p>
+        </p:txBody>
+      </p:sp>
+      <p:sp>
+        <p:nvSpPr>
+          <p:cNvPr id="18" name="右弧形箭头 17"/>
+          <p:cNvSpPr/>
+          <p:nvPr/>
+        </p:nvSpPr>
+        <p:spPr>
+          <a:xfrm>
+            <a:off x="5081270" y="3990975"/>
+            <a:ext cx="695960" cy="666750"/>
+          </a:xfrm>
+          <a:prstGeom prst="curvedLeftArrow">
+            <a:avLst/>
+          </a:prstGeom>
+          <a:solidFill>
+            <a:schemeClr val="accent1"/>
+          </a:solidFill>
+          <a:ln w="9525" cap="flat" cmpd="sng" algn="ctr">
+            <a:solidFill>
+              <a:schemeClr val="tx1"/>
+            </a:solidFill>
+            <a:prstDash val="solid"/>
+            <a:round/>
+            <a:headEnd type="none" w="med" len="med"/>
+            <a:tailEnd type="none" w="med" len="med"/>
+          </a:ln>
+        </p:spPr>
+        <p:txBody>
+          <a:bodyPr vert="horz" wrap="square" lIns="91440" tIns="45720" rIns="91440" bIns="45720" numCol="1" anchor="t" anchorCtr="0" compatLnSpc="1"/>
+          <a:p>
+            <a:pPr marL="0" marR="0" indent="0" algn="l" defTabSz="914400" rtl="0" eaLnBrk="1" fontAlgn="base" latinLnBrk="0" hangingPunct="1">
+              <a:lnSpc>
+                <a:spcPct val="100000"/>
+              </a:lnSpc>
+              <a:spcBef>
+                <a:spcPct val="0"/>
+              </a:spcBef>
+              <a:spcAft>
+                <a:spcPct val="0"/>
+              </a:spcAft>
+              <a:buClrTx/>
+              <a:buSzTx/>
+              <a:buFontTx/>
+              <a:buNone/>
+            </a:pPr>
+            <a:endParaRPr kumimoji="0" lang="zh-CN" altLang="en-US" sz="1800" b="0" i="0" u="none" strike="noStrike" cap="none" normalizeH="0" baseline="0" smtClean="0">
+              <a:ln>
+                <a:noFill/>
+              </a:ln>
+              <a:solidFill>
+                <a:schemeClr val="tx1"/>
+              </a:solidFill>
+              <a:effectLst/>
+              <a:latin typeface="Calibri" panose="020F0702030404030204" charset="0"/>
+              <a:ea typeface="SimSun" pitchFamily="2" charset="-122"/>
+              <a:sym typeface="Calibri" panose="020F0702030404030204" charset="0"/>
+            </a:endParaRPr>
+          </a:p>
+        </p:txBody>
+      </p:sp>
+      <p:sp>
+        <p:nvSpPr>
+          <p:cNvPr id="19" name="右弧形箭头 18"/>
+          <p:cNvSpPr/>
+          <p:nvPr/>
+        </p:nvSpPr>
+        <p:spPr>
+          <a:xfrm>
+            <a:off x="4563745" y="4856480"/>
+            <a:ext cx="606425" cy="785495"/>
+          </a:xfrm>
+          <a:prstGeom prst="curvedLeftArrow">
+            <a:avLst/>
+          </a:prstGeom>
+          <a:solidFill>
+            <a:schemeClr val="accent1"/>
+          </a:solidFill>
+          <a:ln w="9525" cap="flat" cmpd="sng" algn="ctr">
+            <a:solidFill>
+              <a:schemeClr val="tx1"/>
+            </a:solidFill>
+            <a:prstDash val="solid"/>
+            <a:round/>
+            <a:headEnd type="none" w="med" len="med"/>
+            <a:tailEnd type="none" w="med" len="med"/>
+          </a:ln>
+        </p:spPr>
+        <p:txBody>
+          <a:bodyPr vert="horz" wrap="square" lIns="91440" tIns="45720" rIns="91440" bIns="45720" numCol="1" anchor="t" anchorCtr="0" compatLnSpc="1"/>
+          <a:p>
+            <a:pPr marL="0" marR="0" indent="0" algn="l" defTabSz="914400" rtl="0" eaLnBrk="1" fontAlgn="base" latinLnBrk="0" hangingPunct="1">
+              <a:lnSpc>
+                <a:spcPct val="100000"/>
+              </a:lnSpc>
+              <a:spcBef>
+                <a:spcPct val="0"/>
+              </a:spcBef>
+              <a:spcAft>
+                <a:spcPct val="0"/>
+              </a:spcAft>
+              <a:buClrTx/>
+              <a:buSzTx/>
+              <a:buFontTx/>
+              <a:buNone/>
+            </a:pPr>
+            <a:endParaRPr kumimoji="0" lang="zh-CN" altLang="en-US" sz="1800" b="0" i="0" u="none" strike="noStrike" cap="none" normalizeH="0" baseline="0" smtClean="0">
+              <a:ln>
+                <a:noFill/>
+              </a:ln>
+              <a:solidFill>
+                <a:schemeClr val="tx1"/>
+              </a:solidFill>
+              <a:effectLst/>
+              <a:latin typeface="Calibri" panose="020F0702030404030204" charset="0"/>
+              <a:ea typeface="SimSun" pitchFamily="2" charset="-122"/>
+              <a:sym typeface="Calibri" panose="020F0702030404030204" charset="0"/>
+            </a:endParaRPr>
+          </a:p>
+        </p:txBody>
+      </p:sp>
+    </p:spTree>
+  </p:cSld>
+  <p:clrMapOvr>
+    <a:masterClrMapping/>
+  </p:clrMapOvr>
+  <p:transition spd="med">
+    <p:cut/>
+  </p:transition>
+</p:sld>
+</file>
+
+<file path=ppt/slides/slide12.xml><?xml version="1.0" encoding="utf-8"?>
+<p:sld xmlns:a="http://schemas.openxmlformats.org/drawingml/2006/main" xmlns:r="http://schemas.openxmlformats.org/officeDocument/2006/relationships" xmlns:p="http://schemas.openxmlformats.org/presentationml/2006/main">
+  <p:cSld>
+    <p:spTree>
+      <p:nvGrpSpPr>
+        <p:cNvPr id="1" name=""/>
+        <p:cNvGrpSpPr/>
+        <p:nvPr/>
+      </p:nvGrpSpPr>
+      <p:grpSpPr/>
+      <p:sp>
+        <p:nvSpPr>
+          <p:cNvPr id="2" name="标题 1"/>
+          <p:cNvSpPr>
+            <a:spLocks noGrp="1"/>
+          </p:cNvSpPr>
+          <p:nvPr>
+            <p:ph type="title"/>
+          </p:nvPr>
+        </p:nvSpPr>
+        <p:spPr/>
+        <p:txBody>
+          <a:bodyPr/>
+          <a:p>
+            <a:r>
               <a:rPr lang="en-US" altLang="zh-CN" sz="3200" b="1"/>
               <a:t>Method</a:t>
             </a:r>
@@ -5006,7 +5748,7 @@
 </p:sld>
 </file>
 
-<file path=ppt/slides/slide11.xml><?xml version="1.0" encoding="utf-8"?>
+<file path=ppt/slides/slide13.xml><?xml version="1.0" encoding="utf-8"?>
 <p:sld xmlns:a="http://schemas.openxmlformats.org/drawingml/2006/main" xmlns:r="http://schemas.openxmlformats.org/officeDocument/2006/relationships" xmlns:p="http://schemas.openxmlformats.org/presentationml/2006/main">
   <p:cSld>
     <p:spTree>
@@ -5430,7 +6172,7 @@
 </p:sld>
 </file>
 
-<file path=ppt/slides/slide12.xml><?xml version="1.0" encoding="utf-8"?>
+<file path=ppt/slides/slide14.xml><?xml version="1.0" encoding="utf-8"?>
 <p:sld xmlns:a="http://schemas.openxmlformats.org/drawingml/2006/main" xmlns:r="http://schemas.openxmlformats.org/officeDocument/2006/relationships" xmlns:p="http://schemas.openxmlformats.org/presentationml/2006/main">
   <p:cSld>
     <p:spTree>
@@ -5672,7 +6414,7 @@
 </p:sld>
 </file>
 
-<file path=ppt/slides/slide13.xml><?xml version="1.0" encoding="utf-8"?>
+<file path=ppt/slides/slide15.xml><?xml version="1.0" encoding="utf-8"?>
 <p:sld xmlns:a="http://schemas.openxmlformats.org/drawingml/2006/main" xmlns:r="http://schemas.openxmlformats.org/officeDocument/2006/relationships" xmlns:p="http://schemas.openxmlformats.org/presentationml/2006/main">
   <p:cSld>
     <p:spTree>
@@ -5760,7 +6502,7 @@
 </p:sld>
 </file>
 
-<file path=ppt/slides/slide14.xml><?xml version="1.0" encoding="utf-8"?>
+<file path=ppt/slides/slide16.xml><?xml version="1.0" encoding="utf-8"?>
 <p:sld xmlns:a="http://schemas.openxmlformats.org/drawingml/2006/main" xmlns:r="http://schemas.openxmlformats.org/officeDocument/2006/relationships" xmlns:p="http://schemas.openxmlformats.org/presentationml/2006/main">
   <p:cSld>
     <p:spTree>
@@ -6129,7 +6871,7 @@
 </p:sld>
 </file>
 
-<file path=ppt/slides/slide15.xml><?xml version="1.0" encoding="utf-8"?>
+<file path=ppt/slides/slide17.xml><?xml version="1.0" encoding="utf-8"?>
 <p:sld xmlns:a="http://schemas.openxmlformats.org/drawingml/2006/main" xmlns:r="http://schemas.openxmlformats.org/officeDocument/2006/relationships" xmlns:p="http://schemas.openxmlformats.org/presentationml/2006/main">
   <p:cSld>
     <p:spTree>
@@ -8215,10 +8957,10 @@
           <a:bodyPr/>
           <a:p>
             <a:r>
-              <a:rPr lang="zh-CN" altLang="en-US" sz="3200" b="1"/>
-              <a:t>Construction of CCGNet model.</a:t>
-            </a:r>
-            <a:endParaRPr lang="zh-CN" altLang="en-US" sz="3200" b="1"/>
+              <a:rPr lang="en-US" altLang="zh-CN" sz="3200" b="1"/>
+              <a:t>Dataset</a:t>
+            </a:r>
+            <a:endParaRPr lang="en-US" altLang="zh-CN" sz="3200" b="1"/>
           </a:p>
         </p:txBody>
       </p:sp>
@@ -8245,7 +8987,7 @@
       </p:sp>
       <p:pic>
         <p:nvPicPr>
-          <p:cNvPr id="5" name="图片 4"/>
+          <p:cNvPr id="5" name="图片 4" descr="Dataset"/>
           <p:cNvPicPr>
             <a:picLocks noChangeAspect="1"/>
           </p:cNvPicPr>
@@ -8259,246 +9001,14 @@
         </p:blipFill>
         <p:spPr>
           <a:xfrm>
-            <a:off x="1487805" y="1012825"/>
-            <a:ext cx="9372600" cy="5581650"/>
+            <a:off x="660400" y="1322705"/>
+            <a:ext cx="10001250" cy="4867275"/>
           </a:xfrm>
           <a:prstGeom prst="rect">
             <a:avLst/>
           </a:prstGeom>
         </p:spPr>
       </p:pic>
-      <p:sp>
-        <p:nvSpPr>
-          <p:cNvPr id="6" name="圆角矩形 5"/>
-          <p:cNvSpPr/>
-          <p:nvPr/>
-        </p:nvSpPr>
-        <p:spPr>
-          <a:xfrm>
-            <a:off x="6572250" y="1365250"/>
-            <a:ext cx="616585" cy="655955"/>
-          </a:xfrm>
-          <a:prstGeom prst="roundRect">
-            <a:avLst/>
-          </a:prstGeom>
-          <a:noFill/>
-          <a:ln w="25400" cap="flat" cmpd="sng" algn="ctr">
-            <a:solidFill>
-              <a:srgbClr val="FF0000"/>
-            </a:solidFill>
-            <a:prstDash val="solid"/>
-            <a:round/>
-            <a:headEnd type="none" w="med" len="med"/>
-            <a:tailEnd type="none" w="med" len="med"/>
-          </a:ln>
-        </p:spPr>
-        <p:txBody>
-          <a:bodyPr vert="horz" wrap="square" lIns="91440" tIns="45720" rIns="91440" bIns="45720" numCol="1" anchor="t" anchorCtr="0" compatLnSpc="1"/>
-          <a:p>
-            <a:pPr marL="0" marR="0" indent="0" algn="l" defTabSz="914400" rtl="0" eaLnBrk="1" fontAlgn="base" latinLnBrk="0" hangingPunct="1">
-              <a:lnSpc>
-                <a:spcPct val="100000"/>
-              </a:lnSpc>
-              <a:spcBef>
-                <a:spcPct val="0"/>
-              </a:spcBef>
-              <a:spcAft>
-                <a:spcPct val="0"/>
-              </a:spcAft>
-              <a:buClrTx/>
-              <a:buSzTx/>
-              <a:buFontTx/>
-              <a:buNone/>
-            </a:pPr>
-            <a:endParaRPr kumimoji="0" lang="zh-CN" altLang="en-US" sz="1800" b="0" i="0" u="none" strike="noStrike" cap="none" normalizeH="0" baseline="0" smtClean="0">
-              <a:ln>
-                <a:noFill/>
-              </a:ln>
-              <a:solidFill>
-                <a:srgbClr val="000000"/>
-              </a:solidFill>
-              <a:effectLst/>
-              <a:latin typeface="Calibri" panose="020F0702030404030204" charset="0"/>
-              <a:ea typeface="SimSun" pitchFamily="2" charset="-122"/>
-              <a:sym typeface="Calibri" panose="020F0702030404030204" charset="0"/>
-            </a:endParaRPr>
-          </a:p>
-        </p:txBody>
-      </p:sp>
-      <p:sp>
-        <p:nvSpPr>
-          <p:cNvPr id="7" name="圆角矩形 6"/>
-          <p:cNvSpPr/>
-          <p:nvPr/>
-        </p:nvSpPr>
-        <p:spPr>
-          <a:xfrm>
-            <a:off x="6572250" y="2546350"/>
-            <a:ext cx="616585" cy="655955"/>
-          </a:xfrm>
-          <a:prstGeom prst="roundRect">
-            <a:avLst/>
-          </a:prstGeom>
-          <a:noFill/>
-          <a:ln w="25400" cap="flat" cmpd="sng" algn="ctr">
-            <a:solidFill>
-              <a:srgbClr val="FF0000"/>
-            </a:solidFill>
-            <a:prstDash val="solid"/>
-            <a:round/>
-            <a:headEnd type="none" w="med" len="med"/>
-            <a:tailEnd type="none" w="med" len="med"/>
-          </a:ln>
-        </p:spPr>
-        <p:txBody>
-          <a:bodyPr vert="horz" wrap="square" lIns="91440" tIns="45720" rIns="91440" bIns="45720" numCol="1" anchor="t" anchorCtr="0" compatLnSpc="1"/>
-          <a:p>
-            <a:pPr marL="0" marR="0" indent="0" algn="l" defTabSz="914400" rtl="0" eaLnBrk="1" fontAlgn="base" latinLnBrk="0" hangingPunct="1">
-              <a:lnSpc>
-                <a:spcPct val="100000"/>
-              </a:lnSpc>
-              <a:spcBef>
-                <a:spcPct val="0"/>
-              </a:spcBef>
-              <a:spcAft>
-                <a:spcPct val="0"/>
-              </a:spcAft>
-              <a:buClrTx/>
-              <a:buSzTx/>
-              <a:buFontTx/>
-              <a:buNone/>
-            </a:pPr>
-            <a:endParaRPr kumimoji="0" lang="zh-CN" altLang="en-US" sz="1800" b="0" i="0" u="none" strike="noStrike" cap="none" normalizeH="0" baseline="0" smtClean="0">
-              <a:ln>
-                <a:noFill/>
-              </a:ln>
-              <a:solidFill>
-                <a:srgbClr val="000000"/>
-              </a:solidFill>
-              <a:effectLst/>
-              <a:latin typeface="Calibri" panose="020F0702030404030204" charset="0"/>
-              <a:ea typeface="SimSun" pitchFamily="2" charset="-122"/>
-              <a:sym typeface="Calibri" panose="020F0702030404030204" charset="0"/>
-            </a:endParaRPr>
-          </a:p>
-        </p:txBody>
-      </p:sp>
-      <p:sp>
-        <p:nvSpPr>
-          <p:cNvPr id="8" name="圆角矩形 7"/>
-          <p:cNvSpPr/>
-          <p:nvPr/>
-        </p:nvSpPr>
-        <p:spPr>
-          <a:xfrm>
-            <a:off x="4849495" y="1890395"/>
-            <a:ext cx="616585" cy="655955"/>
-          </a:xfrm>
-          <a:prstGeom prst="roundRect">
-            <a:avLst/>
-          </a:prstGeom>
-          <a:noFill/>
-          <a:ln w="25400" cap="flat" cmpd="sng" algn="ctr">
-            <a:solidFill>
-              <a:srgbClr val="FF0000"/>
-            </a:solidFill>
-            <a:prstDash val="solid"/>
-            <a:round/>
-            <a:headEnd type="none" w="med" len="med"/>
-            <a:tailEnd type="none" w="med" len="med"/>
-          </a:ln>
-        </p:spPr>
-        <p:txBody>
-          <a:bodyPr vert="horz" wrap="square" lIns="91440" tIns="45720" rIns="91440" bIns="45720" numCol="1" anchor="t" anchorCtr="0" compatLnSpc="1"/>
-          <a:p>
-            <a:pPr marL="0" marR="0" indent="0" algn="l" defTabSz="914400" rtl="0" eaLnBrk="1" fontAlgn="base" latinLnBrk="0" hangingPunct="1">
-              <a:lnSpc>
-                <a:spcPct val="100000"/>
-              </a:lnSpc>
-              <a:spcBef>
-                <a:spcPct val="0"/>
-              </a:spcBef>
-              <a:spcAft>
-                <a:spcPct val="0"/>
-              </a:spcAft>
-              <a:buClrTx/>
-              <a:buSzTx/>
-              <a:buFontTx/>
-              <a:buNone/>
-            </a:pPr>
-            <a:endParaRPr kumimoji="0" lang="zh-CN" altLang="en-US" sz="1800" b="0" i="0" u="none" strike="noStrike" cap="none" normalizeH="0" baseline="0" smtClean="0">
-              <a:ln>
-                <a:noFill/>
-              </a:ln>
-              <a:solidFill>
-                <a:srgbClr val="000000"/>
-              </a:solidFill>
-              <a:effectLst/>
-              <a:latin typeface="Calibri" panose="020F0702030404030204" charset="0"/>
-              <a:ea typeface="SimSun" pitchFamily="2" charset="-122"/>
-              <a:sym typeface="Calibri" panose="020F0702030404030204" charset="0"/>
-            </a:endParaRPr>
-          </a:p>
-        </p:txBody>
-      </p:sp>
-      <p:sp>
-        <p:nvSpPr>
-          <p:cNvPr id="9" name="圆角矩形 8"/>
-          <p:cNvSpPr/>
-          <p:nvPr/>
-        </p:nvSpPr>
-        <p:spPr>
-          <a:xfrm>
-            <a:off x="2672080" y="3629660"/>
-            <a:ext cx="1471930" cy="507365"/>
-          </a:xfrm>
-          <a:prstGeom prst="roundRect">
-            <a:avLst/>
-          </a:prstGeom>
-          <a:noFill/>
-          <a:ln w="25400" cap="flat" cmpd="sng" algn="ctr">
-            <a:solidFill>
-              <a:srgbClr val="FF0000"/>
-            </a:solidFill>
-            <a:prstDash val="solid"/>
-            <a:round/>
-            <a:headEnd type="none" w="med" len="med"/>
-            <a:tailEnd type="none" w="med" len="med"/>
-          </a:ln>
-        </p:spPr>
-        <p:txBody>
-          <a:bodyPr vert="horz" wrap="square" lIns="91440" tIns="45720" rIns="91440" bIns="45720" numCol="1" anchor="t" anchorCtr="0" compatLnSpc="1"/>
-          <a:p>
-            <a:pPr marL="0" marR="0" indent="0" algn="l" defTabSz="914400" rtl="0" eaLnBrk="1" fontAlgn="base" latinLnBrk="0" hangingPunct="1">
-              <a:lnSpc>
-                <a:spcPct val="100000"/>
-              </a:lnSpc>
-              <a:spcBef>
-                <a:spcPct val="0"/>
-              </a:spcBef>
-              <a:spcAft>
-                <a:spcPct val="0"/>
-              </a:spcAft>
-              <a:buClrTx/>
-              <a:buSzTx/>
-              <a:buFontTx/>
-              <a:buNone/>
-            </a:pPr>
-            <a:endParaRPr kumimoji="0" lang="zh-CN" altLang="en-US" sz="1800" b="0" i="0" u="none" strike="noStrike" cap="none" normalizeH="0" baseline="0" smtClean="0">
-              <a:ln>
-                <a:noFill/>
-              </a:ln>
-              <a:solidFill>
-                <a:srgbClr val="000000"/>
-              </a:solidFill>
-              <a:effectLst/>
-              <a:latin typeface="Calibri" panose="020F0702030404030204" charset="0"/>
-              <a:ea typeface="SimSun" pitchFamily="2" charset="-122"/>
-              <a:sym typeface="Calibri" panose="020F0702030404030204" charset="0"/>
-            </a:endParaRPr>
-          </a:p>
-        </p:txBody>
-      </p:sp>
     </p:spTree>
   </p:cSld>
   <p:clrMapOvr>
@@ -8522,6 +9032,28 @@
       <p:grpSpPr/>
       <p:sp>
         <p:nvSpPr>
+          <p:cNvPr id="2" name="标题 1"/>
+          <p:cNvSpPr>
+            <a:spLocks noGrp="1"/>
+          </p:cNvSpPr>
+          <p:nvPr>
+            <p:ph type="title"/>
+          </p:nvPr>
+        </p:nvSpPr>
+        <p:spPr/>
+        <p:txBody>
+          <a:bodyPr/>
+          <a:p>
+            <a:r>
+              <a:rPr lang="en-US" altLang="zh-CN" sz="3200" b="1"/>
+              <a:t>Data</a:t>
+            </a:r>
+            <a:endParaRPr lang="en-US" altLang="zh-CN" sz="3200" b="1"/>
+          </a:p>
+        </p:txBody>
+      </p:sp>
+      <p:sp>
+        <p:nvSpPr>
           <p:cNvPr id="4" name="灯片编号占位符 3"/>
           <p:cNvSpPr>
             <a:spLocks noGrp="1"/>
@@ -8543,7 +9075,7 @@
       </p:sp>
       <p:pic>
         <p:nvPicPr>
-          <p:cNvPr id="11" name="图片 10"/>
+          <p:cNvPr id="6" name="图片 5"/>
           <p:cNvPicPr>
             <a:picLocks noChangeAspect="1"/>
           </p:cNvPicPr>
@@ -8557,8 +9089,8 @@
         </p:blipFill>
         <p:spPr>
           <a:xfrm>
-            <a:off x="5610860" y="3703955"/>
-            <a:ext cx="6149975" cy="1938020"/>
+            <a:off x="130810" y="1240790"/>
+            <a:ext cx="4695825" cy="1333500"/>
           </a:xfrm>
           <a:prstGeom prst="rect">
             <a:avLst/>
@@ -8567,7 +9099,7 @@
       </p:pic>
       <p:pic>
         <p:nvPicPr>
-          <p:cNvPr id="12" name="图片 11"/>
+          <p:cNvPr id="7" name="图片 6"/>
           <p:cNvPicPr>
             <a:picLocks noChangeAspect="1"/>
           </p:cNvPicPr>
@@ -8581,8 +9113,8 @@
         </p:blipFill>
         <p:spPr>
           <a:xfrm>
-            <a:off x="5963920" y="1686560"/>
-            <a:ext cx="1657350" cy="1409700"/>
+            <a:off x="5200650" y="69215"/>
+            <a:ext cx="6889115" cy="6672580"/>
           </a:xfrm>
           <a:prstGeom prst="rect">
             <a:avLst/>
@@ -8591,7 +9123,7 @@
       </p:pic>
       <p:pic>
         <p:nvPicPr>
-          <p:cNvPr id="13" name="图片 12" descr="Node update function Φv"/>
+          <p:cNvPr id="8" name="图片 7"/>
           <p:cNvPicPr>
             <a:picLocks noChangeAspect="1"/>
           </p:cNvPicPr>
@@ -8605,329 +9137,134 @@
         </p:blipFill>
         <p:spPr>
           <a:xfrm>
-            <a:off x="152400" y="-80010"/>
-            <a:ext cx="5724525" cy="6381750"/>
+            <a:off x="130810" y="2574290"/>
+            <a:ext cx="4714875" cy="847725"/>
           </a:xfrm>
           <a:prstGeom prst="rect">
             <a:avLst/>
           </a:prstGeom>
         </p:spPr>
       </p:pic>
-      <p:sp>
-        <p:nvSpPr>
-          <p:cNvPr id="15" name="下箭头标注 14"/>
-          <p:cNvSpPr/>
+      <p:pic>
+        <p:nvPicPr>
+          <p:cNvPr id="9" name="图片 8"/>
+          <p:cNvPicPr>
+            <a:picLocks noChangeAspect="1"/>
+          </p:cNvPicPr>
           <p:nvPr/>
-        </p:nvSpPr>
+        </p:nvPicPr>
+        <p:blipFill>
+          <a:blip r:embed="rId4"/>
+          <a:stretch>
+            <a:fillRect/>
+          </a:stretch>
+        </p:blipFill>
         <p:spPr>
           <a:xfrm>
-            <a:off x="3639185" y="1006475"/>
-            <a:ext cx="487680" cy="596900"/>
-          </a:xfrm>
-          <a:prstGeom prst="downArrowCallout">
+            <a:off x="292735" y="3559810"/>
+            <a:ext cx="3305175" cy="895350"/>
+          </a:xfrm>
+          <a:prstGeom prst="rect">
             <a:avLst/>
           </a:prstGeom>
-          <a:solidFill>
-            <a:schemeClr val="accent1"/>
-          </a:solidFill>
-          <a:ln w="9525" cap="flat" cmpd="sng" algn="ctr">
-            <a:solidFill>
-              <a:schemeClr val="tx1"/>
-            </a:solidFill>
-            <a:prstDash val="solid"/>
-            <a:round/>
-            <a:headEnd type="none" w="med" len="med"/>
-            <a:tailEnd type="none" w="med" len="med"/>
-          </a:ln>
-        </p:spPr>
-        <p:txBody>
-          <a:bodyPr vert="horz" wrap="square" lIns="91440" tIns="45720" rIns="91440" bIns="45720" numCol="1" anchor="t" anchorCtr="0" compatLnSpc="1"/>
-          <a:p>
-            <a:pPr marL="0" marR="0" indent="0" algn="l" defTabSz="914400" rtl="0" eaLnBrk="1" fontAlgn="base" latinLnBrk="0" hangingPunct="1">
-              <a:lnSpc>
-                <a:spcPct val="100000"/>
-              </a:lnSpc>
-              <a:spcBef>
-                <a:spcPct val="0"/>
-              </a:spcBef>
-              <a:spcAft>
-                <a:spcPct val="0"/>
-              </a:spcAft>
-              <a:buClrTx/>
-              <a:buSzTx/>
-              <a:buFontTx/>
-              <a:buNone/>
-            </a:pPr>
-            <a:r>
-              <a:rPr kumimoji="0" lang="en-US" altLang="zh-CN" sz="1000" b="1" i="0" u="none" strike="noStrike" cap="none" normalizeH="0" baseline="0" smtClean="0">
-                <a:ln>
-                  <a:noFill/>
-                </a:ln>
-                <a:solidFill>
-                  <a:schemeClr val="bg1"/>
-                </a:solidFill>
-                <a:effectLst/>
-                <a:latin typeface="Calibri" panose="020F0702030404030204" charset="0"/>
-                <a:ea typeface="SimSun" pitchFamily="2" charset="-122"/>
-                <a:sym typeface="Calibri" panose="020F0702030404030204" charset="0"/>
-              </a:rPr>
-              <a:t>N*N</a:t>
-            </a:r>
-            <a:endParaRPr kumimoji="0" lang="en-US" altLang="zh-CN" sz="1000" b="1" i="0" u="none" strike="noStrike" cap="none" normalizeH="0" baseline="0" smtClean="0">
-              <a:ln>
-                <a:noFill/>
-              </a:ln>
-              <a:solidFill>
-                <a:schemeClr val="bg1"/>
-              </a:solidFill>
-              <a:effectLst/>
-              <a:latin typeface="Calibri" panose="020F0702030404030204" charset="0"/>
-              <a:ea typeface="SimSun" pitchFamily="2" charset="-122"/>
-              <a:sym typeface="Calibri" panose="020F0702030404030204" charset="0"/>
-            </a:endParaRPr>
-          </a:p>
-        </p:txBody>
-      </p:sp>
-      <p:sp>
-        <p:nvSpPr>
-          <p:cNvPr id="16" name="右弧形箭头 15"/>
-          <p:cNvSpPr/>
+        </p:spPr>
+      </p:pic>
+      <p:pic>
+        <p:nvPicPr>
+          <p:cNvPr id="10" name="图片 9"/>
+          <p:cNvPicPr>
+            <a:picLocks noChangeAspect="1"/>
+          </p:cNvPicPr>
           <p:nvPr/>
-        </p:nvSpPr>
+        </p:nvPicPr>
+        <p:blipFill>
+          <a:blip r:embed="rId5"/>
+          <a:stretch>
+            <a:fillRect/>
+          </a:stretch>
+        </p:blipFill>
         <p:spPr>
           <a:xfrm>
-            <a:off x="4494530" y="1871980"/>
-            <a:ext cx="835025" cy="1064260"/>
-          </a:xfrm>
-          <a:prstGeom prst="curvedLeftArrow">
+            <a:off x="302260" y="4652010"/>
+            <a:ext cx="4543425" cy="1590675"/>
+          </a:xfrm>
+          <a:prstGeom prst="rect">
             <a:avLst/>
           </a:prstGeom>
-          <a:solidFill>
-            <a:schemeClr val="accent1"/>
-          </a:solidFill>
-          <a:ln w="9525" cap="flat" cmpd="sng" algn="ctr">
-            <a:solidFill>
-              <a:schemeClr val="tx1"/>
-            </a:solidFill>
-            <a:prstDash val="solid"/>
-            <a:round/>
-            <a:headEnd type="none" w="med" len="med"/>
-            <a:tailEnd type="none" w="med" len="med"/>
-          </a:ln>
-        </p:spPr>
-        <p:txBody>
-          <a:bodyPr vert="horz" wrap="square" lIns="91440" tIns="45720" rIns="91440" bIns="45720" numCol="1" anchor="t" anchorCtr="0" compatLnSpc="1"/>
-          <a:p>
-            <a:pPr marL="0" marR="0" indent="0" algn="l" defTabSz="914400" rtl="0" eaLnBrk="1" fontAlgn="base" latinLnBrk="0" hangingPunct="1">
-              <a:lnSpc>
-                <a:spcPct val="100000"/>
-              </a:lnSpc>
-              <a:spcBef>
-                <a:spcPct val="0"/>
-              </a:spcBef>
-              <a:spcAft>
-                <a:spcPct val="0"/>
-              </a:spcAft>
-              <a:buClrTx/>
-              <a:buSzTx/>
-              <a:buFontTx/>
-              <a:buNone/>
-            </a:pPr>
-            <a:endParaRPr kumimoji="0" lang="zh-CN" altLang="en-US" sz="1800" b="0" i="0" u="none" strike="noStrike" cap="none" normalizeH="0" baseline="0" smtClean="0">
-              <a:ln>
-                <a:noFill/>
-              </a:ln>
-              <a:solidFill>
-                <a:schemeClr val="tx1"/>
-              </a:solidFill>
-              <a:effectLst/>
-              <a:latin typeface="Calibri" panose="020F0702030404030204" charset="0"/>
-              <a:ea typeface="SimSun" pitchFamily="2" charset="-122"/>
-              <a:sym typeface="Calibri" panose="020F0702030404030204" charset="0"/>
-            </a:endParaRPr>
-          </a:p>
-        </p:txBody>
-      </p:sp>
-      <p:sp>
-        <p:nvSpPr>
-          <p:cNvPr id="17" name="右弧形箭头 16"/>
-          <p:cNvSpPr/>
+        </p:spPr>
+      </p:pic>
+      <p:pic>
+        <p:nvPicPr>
+          <p:cNvPr id="11" name="图片 10"/>
+          <p:cNvPicPr>
+            <a:picLocks noChangeAspect="1"/>
+          </p:cNvPicPr>
           <p:nvPr/>
-        </p:nvSpPr>
+        </p:nvPicPr>
+        <p:blipFill>
+          <a:blip r:embed="rId6"/>
+          <a:stretch>
+            <a:fillRect/>
+          </a:stretch>
+        </p:blipFill>
         <p:spPr>
           <a:xfrm>
-            <a:off x="4563745" y="3096260"/>
-            <a:ext cx="765810" cy="894715"/>
-          </a:xfrm>
-          <a:prstGeom prst="curvedLeftArrow">
+            <a:off x="5419090" y="801370"/>
+            <a:ext cx="5438775" cy="857250"/>
+          </a:xfrm>
+          <a:prstGeom prst="rect">
             <a:avLst/>
           </a:prstGeom>
-          <a:solidFill>
-            <a:schemeClr val="accent1"/>
-          </a:solidFill>
-          <a:ln w="9525" cap="flat" cmpd="sng" algn="ctr">
-            <a:solidFill>
-              <a:schemeClr val="tx1"/>
-            </a:solidFill>
-            <a:prstDash val="solid"/>
-            <a:round/>
-            <a:headEnd type="none" w="med" len="med"/>
-            <a:tailEnd type="none" w="med" len="med"/>
-          </a:ln>
-        </p:spPr>
-        <p:txBody>
-          <a:bodyPr vert="horz" wrap="square" lIns="91440" tIns="45720" rIns="91440" bIns="45720" numCol="1" anchor="t" anchorCtr="0" compatLnSpc="1"/>
-          <a:p>
-            <a:pPr marL="0" marR="0" indent="0" algn="l" defTabSz="914400" rtl="0" eaLnBrk="1" fontAlgn="base" latinLnBrk="0" hangingPunct="1">
-              <a:lnSpc>
-                <a:spcPct val="100000"/>
-              </a:lnSpc>
-              <a:spcBef>
-                <a:spcPct val="0"/>
-              </a:spcBef>
-              <a:spcAft>
-                <a:spcPct val="0"/>
-              </a:spcAft>
-              <a:buClrTx/>
-              <a:buSzTx/>
-              <a:buFontTx/>
-              <a:buNone/>
-            </a:pPr>
-            <a:endParaRPr kumimoji="0" lang="zh-CN" altLang="en-US" sz="1800" b="0" i="0" u="none" strike="noStrike" cap="none" normalizeH="0" baseline="0" smtClean="0">
-              <a:ln>
-                <a:noFill/>
-              </a:ln>
-              <a:solidFill>
-                <a:schemeClr val="tx1"/>
-              </a:solidFill>
-              <a:effectLst/>
-              <a:latin typeface="Calibri" panose="020F0702030404030204" charset="0"/>
-              <a:ea typeface="SimSun" pitchFamily="2" charset="-122"/>
-              <a:sym typeface="Calibri" panose="020F0702030404030204" charset="0"/>
-            </a:endParaRPr>
-          </a:p>
-        </p:txBody>
-      </p:sp>
-      <p:sp>
-        <p:nvSpPr>
-          <p:cNvPr id="18" name="右弧形箭头 17"/>
-          <p:cNvSpPr/>
+        </p:spPr>
+      </p:pic>
+      <p:pic>
+        <p:nvPicPr>
+          <p:cNvPr id="12" name="图片 11"/>
+          <p:cNvPicPr>
+            <a:picLocks noChangeAspect="1"/>
+          </p:cNvPicPr>
           <p:nvPr/>
-        </p:nvSpPr>
+        </p:nvPicPr>
+        <p:blipFill>
+          <a:blip r:embed="rId7"/>
+          <a:stretch>
+            <a:fillRect/>
+          </a:stretch>
+        </p:blipFill>
         <p:spPr>
           <a:xfrm>
-            <a:off x="5081270" y="3990975"/>
-            <a:ext cx="695960" cy="666750"/>
-          </a:xfrm>
-          <a:prstGeom prst="curvedLeftArrow">
+            <a:off x="4709160" y="1896110"/>
+            <a:ext cx="7648575" cy="781050"/>
+          </a:xfrm>
+          <a:prstGeom prst="rect">
             <a:avLst/>
           </a:prstGeom>
-          <a:solidFill>
-            <a:schemeClr val="accent1"/>
-          </a:solidFill>
-          <a:ln w="9525" cap="flat" cmpd="sng" algn="ctr">
-            <a:solidFill>
-              <a:schemeClr val="tx1"/>
-            </a:solidFill>
-            <a:prstDash val="solid"/>
-            <a:round/>
-            <a:headEnd type="none" w="med" len="med"/>
-            <a:tailEnd type="none" w="med" len="med"/>
-          </a:ln>
-        </p:spPr>
-        <p:txBody>
-          <a:bodyPr vert="horz" wrap="square" lIns="91440" tIns="45720" rIns="91440" bIns="45720" numCol="1" anchor="t" anchorCtr="0" compatLnSpc="1"/>
-          <a:p>
-            <a:pPr marL="0" marR="0" indent="0" algn="l" defTabSz="914400" rtl="0" eaLnBrk="1" fontAlgn="base" latinLnBrk="0" hangingPunct="1">
-              <a:lnSpc>
-                <a:spcPct val="100000"/>
-              </a:lnSpc>
-              <a:spcBef>
-                <a:spcPct val="0"/>
-              </a:spcBef>
-              <a:spcAft>
-                <a:spcPct val="0"/>
-              </a:spcAft>
-              <a:buClrTx/>
-              <a:buSzTx/>
-              <a:buFontTx/>
-              <a:buNone/>
-            </a:pPr>
-            <a:endParaRPr kumimoji="0" lang="zh-CN" altLang="en-US" sz="1800" b="0" i="0" u="none" strike="noStrike" cap="none" normalizeH="0" baseline="0" smtClean="0">
-              <a:ln>
-                <a:noFill/>
-              </a:ln>
-              <a:solidFill>
-                <a:schemeClr val="tx1"/>
-              </a:solidFill>
-              <a:effectLst/>
-              <a:latin typeface="Calibri" panose="020F0702030404030204" charset="0"/>
-              <a:ea typeface="SimSun" pitchFamily="2" charset="-122"/>
-              <a:sym typeface="Calibri" panose="020F0702030404030204" charset="0"/>
-            </a:endParaRPr>
-          </a:p>
-        </p:txBody>
-      </p:sp>
-      <p:sp>
-        <p:nvSpPr>
-          <p:cNvPr id="19" name="右弧形箭头 18"/>
-          <p:cNvSpPr/>
+        </p:spPr>
+      </p:pic>
+      <p:pic>
+        <p:nvPicPr>
+          <p:cNvPr id="13" name="图片 12"/>
+          <p:cNvPicPr>
+            <a:picLocks noChangeAspect="1"/>
+          </p:cNvPicPr>
           <p:nvPr/>
-        </p:nvSpPr>
+        </p:nvPicPr>
+        <p:blipFill>
+          <a:blip r:embed="rId8"/>
+          <a:stretch>
+            <a:fillRect/>
+          </a:stretch>
+        </p:blipFill>
         <p:spPr>
           <a:xfrm>
-            <a:off x="4563745" y="4856480"/>
-            <a:ext cx="606425" cy="785495"/>
-          </a:xfrm>
-          <a:prstGeom prst="curvedLeftArrow">
+            <a:off x="4632960" y="3559810"/>
+            <a:ext cx="7724775" cy="752475"/>
+          </a:xfrm>
+          <a:prstGeom prst="rect">
             <a:avLst/>
           </a:prstGeom>
-          <a:solidFill>
-            <a:schemeClr val="accent1"/>
-          </a:solidFill>
-          <a:ln w="9525" cap="flat" cmpd="sng" algn="ctr">
-            <a:solidFill>
-              <a:schemeClr val="tx1"/>
-            </a:solidFill>
-            <a:prstDash val="solid"/>
-            <a:round/>
-            <a:headEnd type="none" w="med" len="med"/>
-            <a:tailEnd type="none" w="med" len="med"/>
-          </a:ln>
-        </p:spPr>
-        <p:txBody>
-          <a:bodyPr vert="horz" wrap="square" lIns="91440" tIns="45720" rIns="91440" bIns="45720" numCol="1" anchor="t" anchorCtr="0" compatLnSpc="1"/>
-          <a:p>
-            <a:pPr marL="0" marR="0" indent="0" algn="l" defTabSz="914400" rtl="0" eaLnBrk="1" fontAlgn="base" latinLnBrk="0" hangingPunct="1">
-              <a:lnSpc>
-                <a:spcPct val="100000"/>
-              </a:lnSpc>
-              <a:spcBef>
-                <a:spcPct val="0"/>
-              </a:spcBef>
-              <a:spcAft>
-                <a:spcPct val="0"/>
-              </a:spcAft>
-              <a:buClrTx/>
-              <a:buSzTx/>
-              <a:buFontTx/>
-              <a:buNone/>
-            </a:pPr>
-            <a:endParaRPr kumimoji="0" lang="zh-CN" altLang="en-US" sz="1800" b="0" i="0" u="none" strike="noStrike" cap="none" normalizeH="0" baseline="0" smtClean="0">
-              <a:ln>
-                <a:noFill/>
-              </a:ln>
-              <a:solidFill>
-                <a:schemeClr val="tx1"/>
-              </a:solidFill>
-              <a:effectLst/>
-              <a:latin typeface="Calibri" panose="020F0702030404030204" charset="0"/>
-              <a:ea typeface="SimSun" pitchFamily="2" charset="-122"/>
-              <a:sym typeface="Calibri" panose="020F0702030404030204" charset="0"/>
-            </a:endParaRPr>
-          </a:p>
-        </p:txBody>
-      </p:sp>
+        </p:spPr>
+      </p:pic>
     </p:spTree>
   </p:cSld>
   <p:clrMapOvr>
@@ -8936,6 +9273,195 @@
   <p:transition spd="med">
     <p:cut/>
   </p:transition>
+  <p:timing>
+    <p:tnLst>
+      <p:par>
+        <p:cTn id="1" dur="indefinite" restart="never" nodeType="tmRoot">
+          <p:childTnLst>
+            <p:seq concurrent="1" nextAc="seek">
+              <p:cTn id="2" dur="indefinite" nodeType="mainSeq">
+                <p:childTnLst>
+                  <p:par>
+                    <p:cTn id="3" fill="hold">
+                      <p:stCondLst>
+                        <p:cond delay="indefinite"/>
+                      </p:stCondLst>
+                      <p:childTnLst>
+                        <p:par>
+                          <p:cTn id="4" fill="hold">
+                            <p:stCondLst>
+                              <p:cond delay="0"/>
+                            </p:stCondLst>
+                            <p:childTnLst>
+                              <p:par>
+                                <p:cTn id="5" presetID="5" presetClass="entr" presetSubtype="10" fill="hold" nodeType="clickEffect">
+                                  <p:stCondLst>
+                                    <p:cond delay="0"/>
+                                  </p:stCondLst>
+                                  <p:childTnLst>
+                                    <p:set>
+                                      <p:cBhvr>
+                                        <p:cTn id="6" dur="1" fill="hold">
+                                          <p:stCondLst>
+                                            <p:cond delay="0"/>
+                                          </p:stCondLst>
+                                        </p:cTn>
+                                        <p:tgtEl>
+                                          <p:spTgt spid="11"/>
+                                        </p:tgtEl>
+                                        <p:attrNameLst>
+                                          <p:attrName>style.visibility</p:attrName>
+                                        </p:attrNameLst>
+                                      </p:cBhvr>
+                                      <p:to>
+                                        <p:strVal val="visible"/>
+                                      </p:to>
+                                    </p:set>
+                                    <p:animEffect transition="in" filter="checkerboard(across)">
+                                      <p:cBhvr>
+                                        <p:cTn id="7" dur="500"/>
+                                        <p:tgtEl>
+                                          <p:spTgt spid="11"/>
+                                        </p:tgtEl>
+                                      </p:cBhvr>
+                                    </p:animEffect>
+                                  </p:childTnLst>
+                                </p:cTn>
+                              </p:par>
+                            </p:childTnLst>
+                          </p:cTn>
+                        </p:par>
+                      </p:childTnLst>
+                    </p:cTn>
+                  </p:par>
+                  <p:par>
+                    <p:cTn id="8" fill="hold">
+                      <p:stCondLst>
+                        <p:cond delay="indefinite"/>
+                      </p:stCondLst>
+                      <p:childTnLst>
+                        <p:par>
+                          <p:cTn id="9" fill="hold">
+                            <p:stCondLst>
+                              <p:cond delay="0"/>
+                            </p:stCondLst>
+                            <p:childTnLst>
+                              <p:par>
+                                <p:cTn id="10" presetID="5" presetClass="entr" presetSubtype="10" fill="hold" nodeType="clickEffect">
+                                  <p:stCondLst>
+                                    <p:cond delay="0"/>
+                                  </p:stCondLst>
+                                  <p:childTnLst>
+                                    <p:set>
+                                      <p:cBhvr>
+                                        <p:cTn id="11" dur="1" fill="hold">
+                                          <p:stCondLst>
+                                            <p:cond delay="0"/>
+                                          </p:stCondLst>
+                                        </p:cTn>
+                                        <p:tgtEl>
+                                          <p:spTgt spid="12"/>
+                                        </p:tgtEl>
+                                        <p:attrNameLst>
+                                          <p:attrName>style.visibility</p:attrName>
+                                        </p:attrNameLst>
+                                      </p:cBhvr>
+                                      <p:to>
+                                        <p:strVal val="visible"/>
+                                      </p:to>
+                                    </p:set>
+                                    <p:animEffect transition="in" filter="checkerboard(across)">
+                                      <p:cBhvr>
+                                        <p:cTn id="12" dur="500"/>
+                                        <p:tgtEl>
+                                          <p:spTgt spid="12"/>
+                                        </p:tgtEl>
+                                      </p:cBhvr>
+                                    </p:animEffect>
+                                  </p:childTnLst>
+                                </p:cTn>
+                              </p:par>
+                            </p:childTnLst>
+                          </p:cTn>
+                        </p:par>
+                      </p:childTnLst>
+                    </p:cTn>
+                  </p:par>
+                  <p:par>
+                    <p:cTn id="13" fill="hold">
+                      <p:stCondLst>
+                        <p:cond delay="indefinite"/>
+                      </p:stCondLst>
+                      <p:childTnLst>
+                        <p:par>
+                          <p:cTn id="14" fill="hold">
+                            <p:stCondLst>
+                              <p:cond delay="0"/>
+                            </p:stCondLst>
+                            <p:childTnLst>
+                              <p:par>
+                                <p:cTn id="15" presetID="5" presetClass="entr" presetSubtype="10" fill="hold" nodeType="clickEffect">
+                                  <p:stCondLst>
+                                    <p:cond delay="0"/>
+                                  </p:stCondLst>
+                                  <p:childTnLst>
+                                    <p:set>
+                                      <p:cBhvr>
+                                        <p:cTn id="16" dur="1" fill="hold">
+                                          <p:stCondLst>
+                                            <p:cond delay="0"/>
+                                          </p:stCondLst>
+                                        </p:cTn>
+                                        <p:tgtEl>
+                                          <p:spTgt spid="13"/>
+                                        </p:tgtEl>
+                                        <p:attrNameLst>
+                                          <p:attrName>style.visibility</p:attrName>
+                                        </p:attrNameLst>
+                                      </p:cBhvr>
+                                      <p:to>
+                                        <p:strVal val="visible"/>
+                                      </p:to>
+                                    </p:set>
+                                    <p:animEffect transition="in" filter="checkerboard(across)">
+                                      <p:cBhvr>
+                                        <p:cTn id="17" dur="500"/>
+                                        <p:tgtEl>
+                                          <p:spTgt spid="13"/>
+                                        </p:tgtEl>
+                                      </p:cBhvr>
+                                    </p:animEffect>
+                                  </p:childTnLst>
+                                </p:cTn>
+                              </p:par>
+                            </p:childTnLst>
+                          </p:cTn>
+                        </p:par>
+                      </p:childTnLst>
+                    </p:cTn>
+                  </p:par>
+                </p:childTnLst>
+              </p:cTn>
+              <p:prevCondLst>
+                <p:cond evt="onPrev" delay="0">
+                  <p:tgtEl>
+                    <p:sldTgt/>
+                  </p:tgtEl>
+                </p:cond>
+              </p:prevCondLst>
+              <p:nextCondLst>
+                <p:cond evt="onNext" delay="0">
+                  <p:tgtEl>
+                    <p:sldTgt/>
+                  </p:tgtEl>
+                </p:cond>
+              </p:nextCondLst>
+            </p:seq>
+          </p:childTnLst>
+        </p:cTn>
+      </p:par>
+    </p:tnLst>
+  </p:timing>
 </p:sld>
 </file>
 

</xml_diff>